<commit_message>
final slide of lessons has a link to lab
</commit_message>
<xml_diff>
--- a/Instructor-Led/Lessons/Module4/Module4_Lesson1 Big Data and Hadoop.pptx
+++ b/Instructor-Led/Lessons/Module4/Module4_Lesson1 Big Data and Hadoop.pptx
@@ -131,7 +131,7 @@
   </p:defaultTextStyle>
   <p:extLst>
     <p:ext uri="{EFAFB233-063F-42B5-8137-9DF3F51BA10A}">
-      <p15:sldGuideLst xmlns:p15="http://schemas.microsoft.com/office/powerpoint/2012/main">
+      <p15:sldGuideLst xmlns:p15="http://schemas.microsoft.com/office/powerpoint/2012/main" xmlns="">
         <p15:guide id="1" orient="horz" pos="2160">
           <p15:clr>
             <a:srgbClr val="A4A3A4"/>
@@ -269,7 +269,7 @@
             <a:fld id="{49B60EF2-7028-489F-85D8-FE86CD7CF2A0}" type="datetimeFigureOut">
               <a:rPr lang="en-US" smtClean="0"/>
               <a:pPr/>
-              <a:t>5/31/2016</a:t>
+              <a:t>6/22/16</a:t>
             </a:fld>
             <a:endParaRPr lang="en-US"/>
           </a:p>
@@ -3867,7 +3867,59 @@
           <a:bodyPr/>
           <a:lstStyle/>
           <a:p>
-            <a:endParaRPr lang="en-US" dirty="0"/>
+            <a:r>
+              <a:rPr lang="en-US" b="1" dirty="0" smtClean="0"/>
+              <a:t>Notes</a:t>
+            </a:r>
+            <a:r>
+              <a:rPr lang="en-US" b="1" baseline="0" dirty="0" smtClean="0"/>
+              <a:t>: </a:t>
+            </a:r>
+          </a:p>
+          <a:p>
+            <a:pPr marL="171450" indent="-171450">
+              <a:buFont typeface="Arial"/>
+              <a:buChar char="•"/>
+            </a:pPr>
+            <a:r>
+              <a:rPr lang="en-US" b="0" baseline="0" dirty="0" smtClean="0"/>
+              <a:t>The Module 4 Lesson 1 Lab should be completed at this time:</a:t>
+            </a:r>
+          </a:p>
+          <a:p>
+            <a:pPr marL="628650" lvl="1" indent="-171450">
+              <a:buFont typeface="Arial"/>
+              <a:buChar char="•"/>
+            </a:pPr>
+            <a:r>
+              <a:rPr lang="en-US" b="0" baseline="0" dirty="0" smtClean="0"/>
+              <a:t>https://</a:t>
+            </a:r>
+            <a:r>
+              <a:rPr lang="en-US" b="0" baseline="0" dirty="0" err="1" smtClean="0"/>
+              <a:t>github.com</a:t>
+            </a:r>
+            <a:r>
+              <a:rPr lang="en-US" b="0" baseline="0" dirty="0" smtClean="0"/>
+              <a:t>/</a:t>
+            </a:r>
+            <a:r>
+              <a:rPr lang="en-US" b="0" baseline="0" dirty="0" err="1" smtClean="0"/>
+              <a:t>MSFTImagine</a:t>
+            </a:r>
+            <a:r>
+              <a:rPr lang="en-US" b="0" baseline="0" dirty="0" smtClean="0"/>
+              <a:t>/</a:t>
+            </a:r>
+            <a:r>
+              <a:rPr lang="en-US" b="0" baseline="0" dirty="0" err="1" smtClean="0"/>
+              <a:t>computerscience</a:t>
+            </a:r>
+            <a:r>
+              <a:rPr lang="en-US" b="0" baseline="0" smtClean="0"/>
+              <a:t>/tree/master/Instructor-Led/Labs/Module4</a:t>
+            </a:r>
+            <a:endParaRPr lang="en-US" b="0" baseline="0" dirty="0" smtClean="0"/>
           </a:p>
         </p:txBody>
       </p:sp>
@@ -5773,7 +5825,7 @@
             <a:fld id="{0459C166-16D3-4A25-A2F8-C51E0E346B22}" type="datetimeFigureOut">
               <a:rPr lang="en-US" smtClean="0"/>
               <a:pPr/>
-              <a:t>5/31/2016</a:t>
+              <a:t>6/22/16</a:t>
             </a:fld>
             <a:endParaRPr lang="en-US"/>
           </a:p>
@@ -6139,7 +6191,7 @@
             <a:fld id="{0459C166-16D3-4A25-A2F8-C51E0E346B22}" type="datetimeFigureOut">
               <a:rPr lang="en-US" smtClean="0"/>
               <a:pPr/>
-              <a:t>5/31/2016</a:t>
+              <a:t>6/22/16</a:t>
             </a:fld>
             <a:endParaRPr lang="en-US"/>
           </a:p>
@@ -6258,7 +6310,7 @@
             <a:fld id="{0459C166-16D3-4A25-A2F8-C51E0E346B22}" type="datetimeFigureOut">
               <a:rPr lang="en-US" smtClean="0"/>
               <a:pPr/>
-              <a:t>5/31/2016</a:t>
+              <a:t>6/22/16</a:t>
             </a:fld>
             <a:endParaRPr lang="en-US"/>
           </a:p>
@@ -6355,7 +6407,7 @@
             <a:fld id="{0459C166-16D3-4A25-A2F8-C51E0E346B22}" type="datetimeFigureOut">
               <a:rPr lang="en-US" smtClean="0"/>
               <a:pPr/>
-              <a:t>5/31/2016</a:t>
+              <a:t>6/22/16</a:t>
             </a:fld>
             <a:endParaRPr lang="en-US"/>
           </a:p>
@@ -6632,7 +6684,7 @@
             <a:fld id="{0459C166-16D3-4A25-A2F8-C51E0E346B22}" type="datetimeFigureOut">
               <a:rPr lang="en-US" smtClean="0"/>
               <a:pPr/>
-              <a:t>5/31/2016</a:t>
+              <a:t>6/22/16</a:t>
             </a:fld>
             <a:endParaRPr lang="en-US"/>
           </a:p>
@@ -6886,7 +6938,7 @@
             <a:fld id="{0459C166-16D3-4A25-A2F8-C51E0E346B22}" type="datetimeFigureOut">
               <a:rPr lang="en-US" smtClean="0"/>
               <a:pPr/>
-              <a:t>5/31/2016</a:t>
+              <a:t>6/22/16</a:t>
             </a:fld>
             <a:endParaRPr lang="en-US"/>
           </a:p>
@@ -7056,7 +7108,7 @@
             <a:fld id="{0459C166-16D3-4A25-A2F8-C51E0E346B22}" type="datetimeFigureOut">
               <a:rPr lang="en-US" smtClean="0"/>
               <a:pPr/>
-              <a:t>5/31/2016</a:t>
+              <a:t>6/22/16</a:t>
             </a:fld>
             <a:endParaRPr lang="en-US"/>
           </a:p>
@@ -7236,7 +7288,7 @@
             <a:fld id="{0459C166-16D3-4A25-A2F8-C51E0E346B22}" type="datetimeFigureOut">
               <a:rPr lang="en-US" smtClean="0"/>
               <a:pPr/>
-              <a:t>5/31/2016</a:t>
+              <a:t>6/22/16</a:t>
             </a:fld>
             <a:endParaRPr lang="en-US"/>
           </a:p>
@@ -7406,7 +7458,7 @@
             <a:fld id="{0459C166-16D3-4A25-A2F8-C51E0E346B22}" type="datetimeFigureOut">
               <a:rPr lang="en-US" smtClean="0"/>
               <a:pPr/>
-              <a:t>5/31/2016</a:t>
+              <a:t>6/22/16</a:t>
             </a:fld>
             <a:endParaRPr lang="en-US"/>
           </a:p>
@@ -7671,7 +7723,7 @@
             <a:fld id="{0459C166-16D3-4A25-A2F8-C51E0E346B22}" type="datetimeFigureOut">
               <a:rPr lang="en-US" smtClean="0"/>
               <a:pPr/>
-              <a:t>5/31/2016</a:t>
+              <a:t>6/22/16</a:t>
             </a:fld>
             <a:endParaRPr lang="en-US"/>
           </a:p>
@@ -7988,7 +8040,7 @@
             <a:fld id="{0459C166-16D3-4A25-A2F8-C51E0E346B22}" type="datetimeFigureOut">
               <a:rPr lang="en-US" smtClean="0"/>
               <a:pPr/>
-              <a:t>5/31/2016</a:t>
+              <a:t>6/22/16</a:t>
             </a:fld>
             <a:endParaRPr lang="en-US"/>
           </a:p>
@@ -8267,7 +8319,7 @@
             <a:fld id="{0459C166-16D3-4A25-A2F8-C51E0E346B22}" type="datetimeFigureOut">
               <a:rPr lang="en-US" smtClean="0"/>
               <a:pPr/>
-              <a:t>5/31/2016</a:t>
+              <a:t>6/22/16</a:t>
             </a:fld>
             <a:endParaRPr lang="en-US"/>
           </a:p>
@@ -9256,7 +9308,7 @@
             <a:fld id="{0459C166-16D3-4A25-A2F8-C51E0E346B22}" type="datetimeFigureOut">
               <a:rPr lang="en-US" smtClean="0"/>
               <a:pPr/>
-              <a:t>5/31/2016</a:t>
+              <a:t>6/22/16</a:t>
             </a:fld>
             <a:endParaRPr lang="en-US"/>
           </a:p>
@@ -9469,7 +9521,7 @@
             <a:fld id="{0459C166-16D3-4A25-A2F8-C51E0E346B22}" type="datetimeFigureOut">
               <a:rPr lang="en-US" smtClean="0"/>
               <a:pPr/>
-              <a:t>5/31/2016</a:t>
+              <a:t>6/22/16</a:t>
             </a:fld>
             <a:endParaRPr lang="en-US"/>
           </a:p>
@@ -12855,14 +12907,14 @@
                 <a:gridCol w="3721592">
                   <a:extLst>
                     <a:ext uri="{9D8B030D-6E8A-4147-A177-3AD203B41FA5}">
-                      <a16:colId xmlns:a16="http://schemas.microsoft.com/office/drawing/2014/main" val="48614039"/>
+                      <a16:colId xmlns:a16="http://schemas.microsoft.com/office/drawing/2014/main" xmlns="" val="48614039"/>
                     </a:ext>
                   </a:extLst>
                 </a:gridCol>
                 <a:gridCol w="6769986">
                   <a:extLst>
                     <a:ext uri="{9D8B030D-6E8A-4147-A177-3AD203B41FA5}">
-                      <a16:colId xmlns:a16="http://schemas.microsoft.com/office/drawing/2014/main" val="1124546490"/>
+                      <a16:colId xmlns:a16="http://schemas.microsoft.com/office/drawing/2014/main" xmlns="" val="1124546490"/>
                     </a:ext>
                   </a:extLst>
                 </a:gridCol>
@@ -12919,7 +12971,7 @@
                 </a:tc>
                 <a:extLst>
                   <a:ext uri="{0D108BD9-81ED-4DB2-BD59-A6C34878D82A}">
-                    <a16:rowId xmlns:a16="http://schemas.microsoft.com/office/drawing/2014/main" val="679667022"/>
+                    <a16:rowId xmlns:a16="http://schemas.microsoft.com/office/drawing/2014/main" xmlns="" val="679667022"/>
                   </a:ext>
                 </a:extLst>
               </a:tr>
@@ -12998,7 +13050,7 @@
                 </a:tc>
                 <a:extLst>
                   <a:ext uri="{0D108BD9-81ED-4DB2-BD59-A6C34878D82A}">
-                    <a16:rowId xmlns:a16="http://schemas.microsoft.com/office/drawing/2014/main" val="2034482246"/>
+                    <a16:rowId xmlns:a16="http://schemas.microsoft.com/office/drawing/2014/main" xmlns="" val="2034482246"/>
                   </a:ext>
                 </a:extLst>
               </a:tr>
@@ -13055,7 +13107,7 @@
                 </a:tc>
                 <a:extLst>
                   <a:ext uri="{0D108BD9-81ED-4DB2-BD59-A6C34878D82A}">
-                    <a16:rowId xmlns:a16="http://schemas.microsoft.com/office/drawing/2014/main" val="682465758"/>
+                    <a16:rowId xmlns:a16="http://schemas.microsoft.com/office/drawing/2014/main" xmlns="" val="682465758"/>
                   </a:ext>
                 </a:extLst>
               </a:tr>
@@ -13114,7 +13166,7 @@
                 </a:tc>
                 <a:extLst>
                   <a:ext uri="{0D108BD9-81ED-4DB2-BD59-A6C34878D82A}">
-                    <a16:rowId xmlns:a16="http://schemas.microsoft.com/office/drawing/2014/main" val="4230228483"/>
+                    <a16:rowId xmlns:a16="http://schemas.microsoft.com/office/drawing/2014/main" xmlns="" val="4230228483"/>
                   </a:ext>
                 </a:extLst>
               </a:tr>
@@ -18717,21 +18769,21 @@
                 <a:gridCol w="2486742">
                   <a:extLst>
                     <a:ext uri="{9D8B030D-6E8A-4147-A177-3AD203B41FA5}">
-                      <a16:colId xmlns:a16="http://schemas.microsoft.com/office/drawing/2014/main" val="48614039"/>
+                      <a16:colId xmlns:a16="http://schemas.microsoft.com/office/drawing/2014/main" xmlns="" val="48614039"/>
                     </a:ext>
                   </a:extLst>
                 </a:gridCol>
                 <a:gridCol w="4523658">
                   <a:extLst>
                     <a:ext uri="{9D8B030D-6E8A-4147-A177-3AD203B41FA5}">
-                      <a16:colId xmlns:a16="http://schemas.microsoft.com/office/drawing/2014/main" val="1124546490"/>
+                      <a16:colId xmlns:a16="http://schemas.microsoft.com/office/drawing/2014/main" xmlns="" val="1124546490"/>
                     </a:ext>
                   </a:extLst>
                 </a:gridCol>
                 <a:gridCol w="3505200">
                   <a:extLst>
                     <a:ext uri="{9D8B030D-6E8A-4147-A177-3AD203B41FA5}">
-                      <a16:colId xmlns:a16="http://schemas.microsoft.com/office/drawing/2014/main" val="2986980724"/>
+                      <a16:colId xmlns:a16="http://schemas.microsoft.com/office/drawing/2014/main" xmlns="" val="2986980724"/>
                     </a:ext>
                   </a:extLst>
                 </a:gridCol>
@@ -18807,7 +18859,7 @@
                 </a:tc>
                 <a:extLst>
                   <a:ext uri="{0D108BD9-81ED-4DB2-BD59-A6C34878D82A}">
-                    <a16:rowId xmlns:a16="http://schemas.microsoft.com/office/drawing/2014/main" val="679667022"/>
+                    <a16:rowId xmlns:a16="http://schemas.microsoft.com/office/drawing/2014/main" xmlns="" val="679667022"/>
                   </a:ext>
                 </a:extLst>
               </a:tr>
@@ -18883,7 +18935,7 @@
                 </a:tc>
                 <a:extLst>
                   <a:ext uri="{0D108BD9-81ED-4DB2-BD59-A6C34878D82A}">
-                    <a16:rowId xmlns:a16="http://schemas.microsoft.com/office/drawing/2014/main" val="2034482246"/>
+                    <a16:rowId xmlns:a16="http://schemas.microsoft.com/office/drawing/2014/main" xmlns="" val="2034482246"/>
                   </a:ext>
                 </a:extLst>
               </a:tr>
@@ -18965,7 +19017,7 @@
                 </a:tc>
                 <a:extLst>
                   <a:ext uri="{0D108BD9-81ED-4DB2-BD59-A6C34878D82A}">
-                    <a16:rowId xmlns:a16="http://schemas.microsoft.com/office/drawing/2014/main" val="682465758"/>
+                    <a16:rowId xmlns:a16="http://schemas.microsoft.com/office/drawing/2014/main" xmlns="" val="682465758"/>
                   </a:ext>
                 </a:extLst>
               </a:tr>
@@ -19032,7 +19084,7 @@
                 </a:tc>
                 <a:extLst>
                   <a:ext uri="{0D108BD9-81ED-4DB2-BD59-A6C34878D82A}">
-                    <a16:rowId xmlns:a16="http://schemas.microsoft.com/office/drawing/2014/main" val="4230228483"/>
+                    <a16:rowId xmlns:a16="http://schemas.microsoft.com/office/drawing/2014/main" xmlns="" val="4230228483"/>
                   </a:ext>
                 </a:extLst>
               </a:tr>
@@ -19104,7 +19156,7 @@
                 </a:tc>
                 <a:extLst>
                   <a:ext uri="{0D108BD9-81ED-4DB2-BD59-A6C34878D82A}">
-                    <a16:rowId xmlns:a16="http://schemas.microsoft.com/office/drawing/2014/main" val="3329658239"/>
+                    <a16:rowId xmlns:a16="http://schemas.microsoft.com/office/drawing/2014/main" xmlns="" val="3329658239"/>
                   </a:ext>
                 </a:extLst>
               </a:tr>
@@ -21854,14 +21906,14 @@
                 <a:gridCol w="3636005">
                   <a:extLst>
                     <a:ext uri="{9D8B030D-6E8A-4147-A177-3AD203B41FA5}">
-                      <a16:colId xmlns:a16="http://schemas.microsoft.com/office/drawing/2014/main" val="48614039"/>
+                      <a16:colId xmlns:a16="http://schemas.microsoft.com/office/drawing/2014/main" xmlns="" val="48614039"/>
                     </a:ext>
                   </a:extLst>
                 </a:gridCol>
                 <a:gridCol w="6614293">
                   <a:extLst>
                     <a:ext uri="{9D8B030D-6E8A-4147-A177-3AD203B41FA5}">
-                      <a16:colId xmlns:a16="http://schemas.microsoft.com/office/drawing/2014/main" val="1124546490"/>
+                      <a16:colId xmlns:a16="http://schemas.microsoft.com/office/drawing/2014/main" xmlns="" val="1124546490"/>
                     </a:ext>
                   </a:extLst>
                 </a:gridCol>
@@ -21913,7 +21965,7 @@
                 </a:tc>
                 <a:extLst>
                   <a:ext uri="{0D108BD9-81ED-4DB2-BD59-A6C34878D82A}">
-                    <a16:rowId xmlns:a16="http://schemas.microsoft.com/office/drawing/2014/main" val="679667022"/>
+                    <a16:rowId xmlns:a16="http://schemas.microsoft.com/office/drawing/2014/main" xmlns="" val="679667022"/>
                   </a:ext>
                 </a:extLst>
               </a:tr>
@@ -21960,7 +22012,7 @@
                 </a:tc>
                 <a:extLst>
                   <a:ext uri="{0D108BD9-81ED-4DB2-BD59-A6C34878D82A}">
-                    <a16:rowId xmlns:a16="http://schemas.microsoft.com/office/drawing/2014/main" val="2034482246"/>
+                    <a16:rowId xmlns:a16="http://schemas.microsoft.com/office/drawing/2014/main" xmlns="" val="2034482246"/>
                   </a:ext>
                 </a:extLst>
               </a:tr>
@@ -22007,7 +22059,7 @@
                 </a:tc>
                 <a:extLst>
                   <a:ext uri="{0D108BD9-81ED-4DB2-BD59-A6C34878D82A}">
-                    <a16:rowId xmlns:a16="http://schemas.microsoft.com/office/drawing/2014/main" val="682465758"/>
+                    <a16:rowId xmlns:a16="http://schemas.microsoft.com/office/drawing/2014/main" xmlns="" val="682465758"/>
                   </a:ext>
                 </a:extLst>
               </a:tr>
@@ -22054,7 +22106,7 @@
                 </a:tc>
                 <a:extLst>
                   <a:ext uri="{0D108BD9-81ED-4DB2-BD59-A6C34878D82A}">
-                    <a16:rowId xmlns:a16="http://schemas.microsoft.com/office/drawing/2014/main" val="4230228483"/>
+                    <a16:rowId xmlns:a16="http://schemas.microsoft.com/office/drawing/2014/main" xmlns="" val="4230228483"/>
                   </a:ext>
                 </a:extLst>
               </a:tr>
@@ -22412,14 +22464,14 @@
                 <a:gridCol w="3706437">
                   <a:extLst>
                     <a:ext uri="{9D8B030D-6E8A-4147-A177-3AD203B41FA5}">
-                      <a16:colId xmlns:a16="http://schemas.microsoft.com/office/drawing/2014/main" val="48614039"/>
+                      <a16:colId xmlns:a16="http://schemas.microsoft.com/office/drawing/2014/main" xmlns="" val="48614039"/>
                     </a:ext>
                   </a:extLst>
                 </a:gridCol>
                 <a:gridCol w="6742419">
                   <a:extLst>
                     <a:ext uri="{9D8B030D-6E8A-4147-A177-3AD203B41FA5}">
-                      <a16:colId xmlns:a16="http://schemas.microsoft.com/office/drawing/2014/main" val="1124546490"/>
+                      <a16:colId xmlns:a16="http://schemas.microsoft.com/office/drawing/2014/main" xmlns="" val="1124546490"/>
                     </a:ext>
                   </a:extLst>
                 </a:gridCol>
@@ -22471,7 +22523,7 @@
                 </a:tc>
                 <a:extLst>
                   <a:ext uri="{0D108BD9-81ED-4DB2-BD59-A6C34878D82A}">
-                    <a16:rowId xmlns:a16="http://schemas.microsoft.com/office/drawing/2014/main" val="679667022"/>
+                    <a16:rowId xmlns:a16="http://schemas.microsoft.com/office/drawing/2014/main" xmlns="" val="679667022"/>
                   </a:ext>
                 </a:extLst>
               </a:tr>
@@ -22518,7 +22570,7 @@
                 </a:tc>
                 <a:extLst>
                   <a:ext uri="{0D108BD9-81ED-4DB2-BD59-A6C34878D82A}">
-                    <a16:rowId xmlns:a16="http://schemas.microsoft.com/office/drawing/2014/main" val="2034482246"/>
+                    <a16:rowId xmlns:a16="http://schemas.microsoft.com/office/drawing/2014/main" xmlns="" val="2034482246"/>
                   </a:ext>
                 </a:extLst>
               </a:tr>
@@ -22565,7 +22617,7 @@
                 </a:tc>
                 <a:extLst>
                   <a:ext uri="{0D108BD9-81ED-4DB2-BD59-A6C34878D82A}">
-                    <a16:rowId xmlns:a16="http://schemas.microsoft.com/office/drawing/2014/main" val="682465758"/>
+                    <a16:rowId xmlns:a16="http://schemas.microsoft.com/office/drawing/2014/main" xmlns="" val="682465758"/>
                   </a:ext>
                 </a:extLst>
               </a:tr>
@@ -22617,7 +22669,7 @@
                 </a:tc>
                 <a:extLst>
                   <a:ext uri="{0D108BD9-81ED-4DB2-BD59-A6C34878D82A}">
-                    <a16:rowId xmlns:a16="http://schemas.microsoft.com/office/drawing/2014/main" val="4230228483"/>
+                    <a16:rowId xmlns:a16="http://schemas.microsoft.com/office/drawing/2014/main" xmlns="" val="4230228483"/>
                   </a:ext>
                 </a:extLst>
               </a:tr>
@@ -22664,7 +22716,7 @@
                 </a:tc>
                 <a:extLst>
                   <a:ext uri="{0D108BD9-81ED-4DB2-BD59-A6C34878D82A}">
-                    <a16:rowId xmlns:a16="http://schemas.microsoft.com/office/drawing/2014/main" val="3329658239"/>
+                    <a16:rowId xmlns:a16="http://schemas.microsoft.com/office/drawing/2014/main" xmlns="" val="3329658239"/>
                   </a:ext>
                 </a:extLst>
               </a:tr>
@@ -22731,7 +22783,7 @@
                 </a:tc>
                 <a:extLst>
                   <a:ext uri="{0D108BD9-81ED-4DB2-BD59-A6C34878D82A}">
-                    <a16:rowId xmlns:a16="http://schemas.microsoft.com/office/drawing/2014/main" val="10005"/>
+                    <a16:rowId xmlns:a16="http://schemas.microsoft.com/office/drawing/2014/main" xmlns="" val="10005"/>
                   </a:ext>
                 </a:extLst>
               </a:tr>
@@ -25428,7 +25480,7 @@
   <a:extraClrSchemeLst/>
   <a:extLst>
     <a:ext uri="{05A4C25C-085E-4340-85A3-A5531E510DB2}">
-      <thm15:themeFamily xmlns:thm15="http://schemas.microsoft.com/office/thememl/2012/main" name="Office Theme" id="{62F939B6-93AF-4DB8-9C6B-D6C7DFDC589F}" vid="{4A3C46E8-61CC-4603-A589-7422A47A8E4A}"/>
+      <thm15:themeFamily xmlns:thm15="http://schemas.microsoft.com/office/thememl/2012/main" xmlns="" name="Office Theme" id="{62F939B6-93AF-4DB8-9C6B-D6C7DFDC589F}" vid="{4A3C46E8-61CC-4603-A589-7422A47A8E4A}"/>
     </a:ext>
   </a:extLst>
 </a:theme>
@@ -25723,7 +25775,7 @@
   <a:extraClrSchemeLst/>
   <a:extLst>
     <a:ext uri="{05A4C25C-085E-4340-85A3-A5531E510DB2}">
-      <thm15:themeFamily xmlns:thm15="http://schemas.microsoft.com/office/thememl/2012/main" name="Office Theme" id="{62F939B6-93AF-4DB8-9C6B-D6C7DFDC589F}" vid="{4A3C46E8-61CC-4603-A589-7422A47A8E4A}"/>
+      <thm15:themeFamily xmlns:thm15="http://schemas.microsoft.com/office/thememl/2012/main" xmlns="" name="Office Theme" id="{62F939B6-93AF-4DB8-9C6B-D6C7DFDC589F}" vid="{4A3C46E8-61CC-4603-A589-7422A47A8E4A}"/>
     </a:ext>
   </a:extLst>
 </a:theme>

</xml_diff>